<commit_message>
Presentation v2 first slide
</commit_message>
<xml_diff>
--- a/Park-e_presentation_v2.pptx
+++ b/Park-e_presentation_v2.pptx
@@ -121,10 +121,6 @@
     </p:ext>
   </p:extLst>
 </p:presentation>
-</file>
-
-<file path=ppt/revisionInfo.xml><?xml version="1.0" encoding="utf-8"?>
-<p1510:revInfo xmlns:a="http://schemas.openxmlformats.org/drawingml/2006/main" xmlns:r="http://schemas.openxmlformats.org/officeDocument/2006/relationships" xmlns:p1510="http://schemas.microsoft.com/office/powerpoint/2015/10/main"/>
 </file>
 
 <file path=ppt/slideLayouts/slideLayout1.xml><?xml version="1.0" encoding="utf-8"?>
@@ -3362,10 +3358,10 @@
             <a:avLst/>
           </a:prstGeom>
           <a:solidFill>
-            <a:srgbClr val="9ACD4C">
-              <a:lumMod val="60000"/>
-              <a:lumOff val="40000"/>
-            </a:srgbClr>
+            <a:schemeClr val="accent6">
+              <a:lumMod val="20000"/>
+              <a:lumOff val="80000"/>
+            </a:schemeClr>
           </a:solidFill>
           <a:ln w="31750" cap="flat" cmpd="sng" algn="ctr">
             <a:solidFill>
@@ -3494,7 +3490,7 @@
         </p:nvSpPr>
         <p:spPr>
           <a:xfrm>
-            <a:off x="171450" y="304800"/>
+            <a:off x="1259032" y="1082601"/>
             <a:ext cx="1286891" cy="369332"/>
           </a:xfrm>
           <a:prstGeom prst="rect">
@@ -3538,7 +3534,7 @@
         </p:nvSpPr>
         <p:spPr>
           <a:xfrm>
-            <a:off x="171450" y="6105525"/>
+            <a:off x="1259032" y="5424122"/>
             <a:ext cx="1170705" cy="369332"/>
           </a:xfrm>
           <a:prstGeom prst="rect">
@@ -3578,7 +3574,7 @@
         </p:nvSpPr>
         <p:spPr>
           <a:xfrm>
-            <a:off x="9143194" y="918051"/>
+            <a:off x="9164145" y="1101188"/>
             <a:ext cx="2804166" cy="646331"/>
           </a:xfrm>
           <a:prstGeom prst="rect">
@@ -3638,7 +3634,7 @@
         </p:nvSpPr>
         <p:spPr>
           <a:xfrm>
-            <a:off x="9791700" y="6105525"/>
+            <a:off x="9159771" y="5476879"/>
             <a:ext cx="2278444" cy="369332"/>
           </a:xfrm>
           <a:prstGeom prst="rect">
@@ -3707,7 +3703,7 @@
         </p:blipFill>
         <p:spPr>
           <a:xfrm rot="14979993">
-            <a:off x="7584339" y="-12268"/>
+            <a:off x="8012891" y="11262"/>
             <a:ext cx="1037540" cy="1926798"/>
           </a:xfrm>
           <a:prstGeom prst="rect">
@@ -3746,7 +3742,7 @@
         </p:blipFill>
         <p:spPr>
           <a:xfrm rot="4192433">
-            <a:off x="8624424" y="1419570"/>
+            <a:off x="8645375" y="1477069"/>
             <a:ext cx="1037540" cy="1926798"/>
           </a:xfrm>
           <a:prstGeom prst="rect">
@@ -3785,7 +3781,7 @@
         </p:blipFill>
         <p:spPr>
           <a:xfrm rot="14979993">
-            <a:off x="2486491" y="3435782"/>
+            <a:off x="2486491" y="3435781"/>
             <a:ext cx="1037540" cy="1926798"/>
           </a:xfrm>
           <a:prstGeom prst="rect">
@@ -3824,8 +3820,731 @@
         </p:blipFill>
         <p:spPr>
           <a:xfrm rot="4192433">
-            <a:off x="3118975" y="4946093"/>
+            <a:off x="3118975" y="5055041"/>
             <a:ext cx="1037540" cy="1926798"/>
+          </a:xfrm>
+          <a:prstGeom prst="rect">
+            <a:avLst/>
+          </a:prstGeom>
+        </p:spPr>
+      </p:pic>
+      <p:pic>
+        <p:nvPicPr>
+          <p:cNvPr id="17" name="Graphic 16" descr="Line Arrow: Counterclockwise curve">
+            <a:extLst>
+              <a:ext uri="{FF2B5EF4-FFF2-40B4-BE49-F238E27FC236}">
+                <a16:creationId xmlns:a16="http://schemas.microsoft.com/office/drawing/2014/main" id="{9B6EDB1A-0A13-4A64-9E8C-D9A2300D2F20}"/>
+              </a:ext>
+            </a:extLst>
+          </p:cNvPr>
+          <p:cNvPicPr>
+            <a:picLocks noChangeAspect="1"/>
+          </p:cNvPicPr>
+          <p:nvPr/>
+        </p:nvPicPr>
+        <p:blipFill>
+          <a:blip r:embed="rId2">
+            <a:extLst>
+              <a:ext uri="{28A0092B-C50C-407E-A947-70E740481C1C}">
+                <a14:useLocalDpi xmlns:a14="http://schemas.microsoft.com/office/drawing/2010/main" val="0"/>
+              </a:ext>
+              <a:ext uri="{96DAC541-7B7A-43D3-8B79-37D633B846F1}">
+                <asvg:svgBlip xmlns:asvg="http://schemas.microsoft.com/office/drawing/2016/SVG/main" r:embed="rId3"/>
+              </a:ext>
+            </a:extLst>
+          </a:blip>
+          <a:stretch>
+            <a:fillRect/>
+          </a:stretch>
+        </p:blipFill>
+        <p:spPr>
+          <a:xfrm rot="7578718">
+            <a:off x="2486603" y="1477069"/>
+            <a:ext cx="1037540" cy="1926798"/>
+          </a:xfrm>
+          <a:prstGeom prst="rect">
+            <a:avLst/>
+          </a:prstGeom>
+        </p:spPr>
+      </p:pic>
+      <p:pic>
+        <p:nvPicPr>
+          <p:cNvPr id="18" name="Graphic 17" descr="Line Arrow: Counterclockwise curve">
+            <a:extLst>
+              <a:ext uri="{FF2B5EF4-FFF2-40B4-BE49-F238E27FC236}">
+                <a16:creationId xmlns:a16="http://schemas.microsoft.com/office/drawing/2014/main" id="{C89BD94D-849C-4AF1-A574-7C2FDCAB56BF}"/>
+              </a:ext>
+            </a:extLst>
+          </p:cNvPr>
+          <p:cNvPicPr>
+            <a:picLocks noChangeAspect="1"/>
+          </p:cNvPicPr>
+          <p:nvPr/>
+        </p:nvPicPr>
+        <p:blipFill>
+          <a:blip r:embed="rId2">
+            <a:extLst>
+              <a:ext uri="{28A0092B-C50C-407E-A947-70E740481C1C}">
+                <a14:useLocalDpi xmlns:a14="http://schemas.microsoft.com/office/drawing/2010/main" val="0"/>
+              </a:ext>
+              <a:ext uri="{96DAC541-7B7A-43D3-8B79-37D633B846F1}">
+                <asvg:svgBlip xmlns:asvg="http://schemas.microsoft.com/office/drawing/2016/SVG/main" r:embed="rId3"/>
+              </a:ext>
+            </a:extLst>
+          </a:blip>
+          <a:stretch>
+            <a:fillRect/>
+          </a:stretch>
+        </p:blipFill>
+        <p:spPr>
+          <a:xfrm rot="18280022">
+            <a:off x="3114601" y="11262"/>
+            <a:ext cx="1037540" cy="1926798"/>
+          </a:xfrm>
+          <a:prstGeom prst="rect">
+            <a:avLst/>
+          </a:prstGeom>
+        </p:spPr>
+      </p:pic>
+      <p:pic>
+        <p:nvPicPr>
+          <p:cNvPr id="19" name="Graphic 18" descr="Line Arrow: Counterclockwise curve">
+            <a:extLst>
+              <a:ext uri="{FF2B5EF4-FFF2-40B4-BE49-F238E27FC236}">
+                <a16:creationId xmlns:a16="http://schemas.microsoft.com/office/drawing/2014/main" id="{FE8EBB4F-569E-451E-8EAA-7903C71CC19C}"/>
+              </a:ext>
+            </a:extLst>
+          </p:cNvPr>
+          <p:cNvPicPr>
+            <a:picLocks noChangeAspect="1"/>
+          </p:cNvPicPr>
+          <p:nvPr/>
+        </p:nvPicPr>
+        <p:blipFill>
+          <a:blip r:embed="rId2">
+            <a:extLst>
+              <a:ext uri="{28A0092B-C50C-407E-A947-70E740481C1C}">
+                <a14:useLocalDpi xmlns:a14="http://schemas.microsoft.com/office/drawing/2010/main" val="0"/>
+              </a:ext>
+              <a:ext uri="{96DAC541-7B7A-43D3-8B79-37D633B846F1}">
+                <asvg:svgBlip xmlns:asvg="http://schemas.microsoft.com/office/drawing/2016/SVG/main" r:embed="rId3"/>
+              </a:ext>
+            </a:extLst>
+          </a:blip>
+          <a:stretch>
+            <a:fillRect/>
+          </a:stretch>
+        </p:blipFill>
+        <p:spPr>
+          <a:xfrm rot="7578718">
+            <a:off x="8013003" y="5055041"/>
+            <a:ext cx="1037540" cy="1926798"/>
+          </a:xfrm>
+          <a:prstGeom prst="rect">
+            <a:avLst/>
+          </a:prstGeom>
+        </p:spPr>
+      </p:pic>
+      <p:pic>
+        <p:nvPicPr>
+          <p:cNvPr id="20" name="Graphic 19" descr="Line Arrow: Counterclockwise curve">
+            <a:extLst>
+              <a:ext uri="{FF2B5EF4-FFF2-40B4-BE49-F238E27FC236}">
+                <a16:creationId xmlns:a16="http://schemas.microsoft.com/office/drawing/2014/main" id="{93E0FE9E-A95B-49B2-8B62-B6961E9D61E6}"/>
+              </a:ext>
+            </a:extLst>
+          </p:cNvPr>
+          <p:cNvPicPr>
+            <a:picLocks noChangeAspect="1"/>
+          </p:cNvPicPr>
+          <p:nvPr/>
+        </p:nvPicPr>
+        <p:blipFill>
+          <a:blip r:embed="rId2">
+            <a:extLst>
+              <a:ext uri="{28A0092B-C50C-407E-A947-70E740481C1C}">
+                <a14:useLocalDpi xmlns:a14="http://schemas.microsoft.com/office/drawing/2010/main" val="0"/>
+              </a:ext>
+              <a:ext uri="{96DAC541-7B7A-43D3-8B79-37D633B846F1}">
+                <asvg:svgBlip xmlns:asvg="http://schemas.microsoft.com/office/drawing/2016/SVG/main" r:embed="rId3"/>
+              </a:ext>
+            </a:extLst>
+          </a:blip>
+          <a:stretch>
+            <a:fillRect/>
+          </a:stretch>
+        </p:blipFill>
+        <p:spPr>
+          <a:xfrm rot="18280022">
+            <a:off x="8641001" y="3589234"/>
+            <a:ext cx="1037540" cy="1926798"/>
+          </a:xfrm>
+          <a:prstGeom prst="rect">
+            <a:avLst/>
+          </a:prstGeom>
+        </p:spPr>
+      </p:pic>
+      <p:pic>
+        <p:nvPicPr>
+          <p:cNvPr id="22" name="Graphic 21" descr="Coins">
+            <a:extLst>
+              <a:ext uri="{FF2B5EF4-FFF2-40B4-BE49-F238E27FC236}">
+                <a16:creationId xmlns:a16="http://schemas.microsoft.com/office/drawing/2014/main" id="{FC64EF80-A736-4714-A3D6-DB968EA5C21D}"/>
+              </a:ext>
+            </a:extLst>
+          </p:cNvPr>
+          <p:cNvPicPr>
+            <a:picLocks noChangeAspect="1"/>
+          </p:cNvPicPr>
+          <p:nvPr/>
+        </p:nvPicPr>
+        <p:blipFill>
+          <a:blip r:embed="rId4">
+            <a:extLst>
+              <a:ext uri="{28A0092B-C50C-407E-A947-70E740481C1C}">
+                <a14:useLocalDpi xmlns:a14="http://schemas.microsoft.com/office/drawing/2010/main" val="0"/>
+              </a:ext>
+              <a:ext uri="{96DAC541-7B7A-43D3-8B79-37D633B846F1}">
+                <asvg:svgBlip xmlns:asvg="http://schemas.microsoft.com/office/drawing/2016/SVG/main" r:embed="rId5"/>
+              </a:ext>
+            </a:extLst>
+          </a:blip>
+          <a:stretch>
+            <a:fillRect/>
+          </a:stretch>
+        </p:blipFill>
+        <p:spPr>
+          <a:xfrm>
+            <a:off x="2554671" y="2571305"/>
+            <a:ext cx="559067" cy="559067"/>
+          </a:xfrm>
+          <a:prstGeom prst="rect">
+            <a:avLst/>
+          </a:prstGeom>
+        </p:spPr>
+      </p:pic>
+      <p:pic>
+        <p:nvPicPr>
+          <p:cNvPr id="24" name="Graphic 23" descr="Upward trend">
+            <a:extLst>
+              <a:ext uri="{FF2B5EF4-FFF2-40B4-BE49-F238E27FC236}">
+                <a16:creationId xmlns:a16="http://schemas.microsoft.com/office/drawing/2014/main" id="{977FEFA5-68E3-4401-8A11-385F3D8302F1}"/>
+              </a:ext>
+            </a:extLst>
+          </p:cNvPr>
+          <p:cNvPicPr>
+            <a:picLocks noChangeAspect="1"/>
+          </p:cNvPicPr>
+          <p:nvPr/>
+        </p:nvPicPr>
+        <p:blipFill>
+          <a:blip r:embed="rId6">
+            <a:extLst>
+              <a:ext uri="{28A0092B-C50C-407E-A947-70E740481C1C}">
+                <a14:useLocalDpi xmlns:a14="http://schemas.microsoft.com/office/drawing/2010/main" val="0"/>
+              </a:ext>
+              <a:ext uri="{96DAC541-7B7A-43D3-8B79-37D633B846F1}">
+                <asvg:svgBlip xmlns:asvg="http://schemas.microsoft.com/office/drawing/2016/SVG/main" r:embed="rId7"/>
+              </a:ext>
+            </a:extLst>
+          </a:blip>
+          <a:stretch>
+            <a:fillRect/>
+          </a:stretch>
+        </p:blipFill>
+        <p:spPr>
+          <a:xfrm>
+            <a:off x="2790191" y="1937754"/>
+            <a:ext cx="559067" cy="559067"/>
+          </a:xfrm>
+          <a:prstGeom prst="rect">
+            <a:avLst/>
+          </a:prstGeom>
+        </p:spPr>
+      </p:pic>
+      <p:pic>
+        <p:nvPicPr>
+          <p:cNvPr id="26" name="Graphic 25" descr="High Voltage">
+            <a:extLst>
+              <a:ext uri="{FF2B5EF4-FFF2-40B4-BE49-F238E27FC236}">
+                <a16:creationId xmlns:a16="http://schemas.microsoft.com/office/drawing/2014/main" id="{39508906-BAB2-4D1F-A3A4-97BAB5FA2D61}"/>
+              </a:ext>
+            </a:extLst>
+          </p:cNvPr>
+          <p:cNvPicPr>
+            <a:picLocks noChangeAspect="1"/>
+          </p:cNvPicPr>
+          <p:nvPr/>
+        </p:nvPicPr>
+        <p:blipFill>
+          <a:blip r:embed="rId8">
+            <a:extLst>
+              <a:ext uri="{28A0092B-C50C-407E-A947-70E740481C1C}">
+                <a14:useLocalDpi xmlns:a14="http://schemas.microsoft.com/office/drawing/2010/main" val="0"/>
+              </a:ext>
+              <a:ext uri="{96DAC541-7B7A-43D3-8B79-37D633B846F1}">
+                <asvg:svgBlip xmlns:asvg="http://schemas.microsoft.com/office/drawing/2016/SVG/main" r:embed="rId9"/>
+              </a:ext>
+            </a:extLst>
+          </a:blip>
+          <a:stretch>
+            <a:fillRect/>
+          </a:stretch>
+        </p:blipFill>
+        <p:spPr>
+          <a:xfrm>
+            <a:off x="3606960" y="1006734"/>
+            <a:ext cx="436741" cy="436741"/>
+          </a:xfrm>
+          <a:prstGeom prst="rect">
+            <a:avLst/>
+          </a:prstGeom>
+        </p:spPr>
+      </p:pic>
+      <p:pic>
+        <p:nvPicPr>
+          <p:cNvPr id="27" name="Graphic 26" descr="Upward trend">
+            <a:extLst>
+              <a:ext uri="{FF2B5EF4-FFF2-40B4-BE49-F238E27FC236}">
+                <a16:creationId xmlns:a16="http://schemas.microsoft.com/office/drawing/2014/main" id="{5DF8F804-F371-4B6E-B436-A87D947A0E0C}"/>
+              </a:ext>
+            </a:extLst>
+          </p:cNvPr>
+          <p:cNvPicPr>
+            <a:picLocks noChangeAspect="1"/>
+          </p:cNvPicPr>
+          <p:nvPr/>
+        </p:nvPicPr>
+        <p:blipFill>
+          <a:blip r:embed="rId6">
+            <a:extLst>
+              <a:ext uri="{28A0092B-C50C-407E-A947-70E740481C1C}">
+                <a14:useLocalDpi xmlns:a14="http://schemas.microsoft.com/office/drawing/2010/main" val="0"/>
+              </a:ext>
+              <a:ext uri="{96DAC541-7B7A-43D3-8B79-37D633B846F1}">
+                <asvg:svgBlip xmlns:asvg="http://schemas.microsoft.com/office/drawing/2016/SVG/main" r:embed="rId7"/>
+              </a:ext>
+            </a:extLst>
+          </a:blip>
+          <a:stretch>
+            <a:fillRect/>
+          </a:stretch>
+        </p:blipFill>
+        <p:spPr>
+          <a:xfrm>
+            <a:off x="8324545" y="5527295"/>
+            <a:ext cx="559067" cy="559067"/>
+          </a:xfrm>
+          <a:prstGeom prst="rect">
+            <a:avLst/>
+          </a:prstGeom>
+        </p:spPr>
+      </p:pic>
+      <p:pic>
+        <p:nvPicPr>
+          <p:cNvPr id="28" name="Graphic 27" descr="Coins">
+            <a:extLst>
+              <a:ext uri="{FF2B5EF4-FFF2-40B4-BE49-F238E27FC236}">
+                <a16:creationId xmlns:a16="http://schemas.microsoft.com/office/drawing/2014/main" id="{BCF512BD-47FB-4C5B-A9FD-017D50DFF7C7}"/>
+              </a:ext>
+            </a:extLst>
+          </p:cNvPr>
+          <p:cNvPicPr>
+            <a:picLocks noChangeAspect="1"/>
+          </p:cNvPicPr>
+          <p:nvPr/>
+        </p:nvPicPr>
+        <p:blipFill>
+          <a:blip r:embed="rId4">
+            <a:extLst>
+              <a:ext uri="{28A0092B-C50C-407E-A947-70E740481C1C}">
+                <a14:useLocalDpi xmlns:a14="http://schemas.microsoft.com/office/drawing/2010/main" val="0"/>
+              </a:ext>
+              <a:ext uri="{96DAC541-7B7A-43D3-8B79-37D633B846F1}">
+                <asvg:svgBlip xmlns:asvg="http://schemas.microsoft.com/office/drawing/2016/SVG/main" r:embed="rId5"/>
+              </a:ext>
+            </a:extLst>
+          </a:blip>
+          <a:stretch>
+            <a:fillRect/>
+          </a:stretch>
+        </p:blipFill>
+        <p:spPr>
+          <a:xfrm>
+            <a:off x="8038160" y="6107580"/>
+            <a:ext cx="559067" cy="559067"/>
+          </a:xfrm>
+          <a:prstGeom prst="rect">
+            <a:avLst/>
+          </a:prstGeom>
+        </p:spPr>
+      </p:pic>
+      <p:pic>
+        <p:nvPicPr>
+          <p:cNvPr id="29" name="Graphic 28" descr="Coins">
+            <a:extLst>
+              <a:ext uri="{FF2B5EF4-FFF2-40B4-BE49-F238E27FC236}">
+                <a16:creationId xmlns:a16="http://schemas.microsoft.com/office/drawing/2014/main" id="{E7569641-F72C-4122-A550-F8B611FD8CF8}"/>
+              </a:ext>
+            </a:extLst>
+          </p:cNvPr>
+          <p:cNvPicPr>
+            <a:picLocks noChangeAspect="1"/>
+          </p:cNvPicPr>
+          <p:nvPr/>
+        </p:nvPicPr>
+        <p:blipFill>
+          <a:blip r:embed="rId4">
+            <a:extLst>
+              <a:ext uri="{28A0092B-C50C-407E-A947-70E740481C1C}">
+                <a14:useLocalDpi xmlns:a14="http://schemas.microsoft.com/office/drawing/2010/main" val="0"/>
+              </a:ext>
+              <a:ext uri="{96DAC541-7B7A-43D3-8B79-37D633B846F1}">
+                <asvg:svgBlip xmlns:asvg="http://schemas.microsoft.com/office/drawing/2016/SVG/main" r:embed="rId5"/>
+              </a:ext>
+            </a:extLst>
+          </a:blip>
+          <a:stretch>
+            <a:fillRect/>
+          </a:stretch>
+        </p:blipFill>
+        <p:spPr>
+          <a:xfrm>
+            <a:off x="8736148" y="1993397"/>
+            <a:ext cx="559067" cy="559067"/>
+          </a:xfrm>
+          <a:prstGeom prst="rect">
+            <a:avLst/>
+          </a:prstGeom>
+        </p:spPr>
+      </p:pic>
+      <p:sp>
+        <p:nvSpPr>
+          <p:cNvPr id="31" name="TextBox 30">
+            <a:extLst>
+              <a:ext uri="{FF2B5EF4-FFF2-40B4-BE49-F238E27FC236}">
+                <a16:creationId xmlns:a16="http://schemas.microsoft.com/office/drawing/2014/main" id="{6F2557A3-2459-44D3-8DE7-E841F2D7D60F}"/>
+              </a:ext>
+            </a:extLst>
+          </p:cNvPr>
+          <p:cNvSpPr txBox="1"/>
+          <p:nvPr/>
+        </p:nvSpPr>
+        <p:spPr>
+          <a:xfrm>
+            <a:off x="3431908" y="248543"/>
+            <a:ext cx="515567" cy="396469"/>
+          </a:xfrm>
+          <a:prstGeom prst="rect">
+            <a:avLst/>
+          </a:prstGeom>
+          <a:solidFill>
+            <a:srgbClr val="00B0F0"/>
+          </a:solidFill>
+          <a:ln w="38100">
+            <a:solidFill>
+              <a:schemeClr val="tx1"/>
+            </a:solidFill>
+          </a:ln>
+        </p:spPr>
+        <p:txBody>
+          <a:bodyPr wrap="square" rtlCol="0">
+            <a:spAutoFit/>
+          </a:bodyPr>
+          <a:lstStyle/>
+          <a:p>
+            <a:r>
+              <a:rPr lang="hu-HU" sz="2000" dirty="0" err="1"/>
+              <a:t>e</a:t>
+            </a:r>
+            <a:r>
+              <a:rPr lang="hu-HU" sz="2000" dirty="0" err="1">
+                <a:solidFill>
+                  <a:schemeClr val="bg1"/>
+                </a:solidFill>
+                <a:latin typeface="Arial" panose="020B0604020202020204" pitchFamily="34" charset="0"/>
+                <a:cs typeface="Arial" panose="020B0604020202020204" pitchFamily="34" charset="0"/>
+              </a:rPr>
+              <a:t>P</a:t>
+            </a:r>
+            <a:endParaRPr lang="en-US" sz="2000" dirty="0">
+              <a:solidFill>
+                <a:schemeClr val="bg1"/>
+              </a:solidFill>
+              <a:latin typeface="Arial" panose="020B0604020202020204" pitchFamily="34" charset="0"/>
+              <a:cs typeface="Arial" panose="020B0604020202020204" pitchFamily="34" charset="0"/>
+            </a:endParaRPr>
+          </a:p>
+        </p:txBody>
+      </p:sp>
+      <p:sp>
+        <p:nvSpPr>
+          <p:cNvPr id="32" name="TextBox 31">
+            <a:extLst>
+              <a:ext uri="{FF2B5EF4-FFF2-40B4-BE49-F238E27FC236}">
+                <a16:creationId xmlns:a16="http://schemas.microsoft.com/office/drawing/2014/main" id="{FE8285FA-493C-4ED4-9868-461B2AB7768A}"/>
+              </a:ext>
+            </a:extLst>
+          </p:cNvPr>
+          <p:cNvSpPr txBox="1"/>
+          <p:nvPr/>
+        </p:nvSpPr>
+        <p:spPr>
+          <a:xfrm>
+            <a:off x="8533300" y="929902"/>
+            <a:ext cx="515567" cy="396469"/>
+          </a:xfrm>
+          <a:prstGeom prst="rect">
+            <a:avLst/>
+          </a:prstGeom>
+          <a:solidFill>
+            <a:srgbClr val="00B0F0"/>
+          </a:solidFill>
+          <a:ln w="38100">
+            <a:solidFill>
+              <a:schemeClr val="tx1"/>
+            </a:solidFill>
+          </a:ln>
+        </p:spPr>
+        <p:txBody>
+          <a:bodyPr wrap="square" rtlCol="0">
+            <a:spAutoFit/>
+          </a:bodyPr>
+          <a:lstStyle/>
+          <a:p>
+            <a:r>
+              <a:rPr lang="hu-HU" sz="2000" dirty="0" err="1"/>
+              <a:t>e</a:t>
+            </a:r>
+            <a:r>
+              <a:rPr lang="hu-HU" sz="2000" dirty="0" err="1">
+                <a:solidFill>
+                  <a:schemeClr val="bg1"/>
+                </a:solidFill>
+                <a:latin typeface="Arial" panose="020B0604020202020204" pitchFamily="34" charset="0"/>
+                <a:cs typeface="Arial" panose="020B0604020202020204" pitchFamily="34" charset="0"/>
+              </a:rPr>
+              <a:t>P</a:t>
+            </a:r>
+            <a:endParaRPr lang="en-US" sz="2000" dirty="0">
+              <a:solidFill>
+                <a:schemeClr val="bg1"/>
+              </a:solidFill>
+              <a:latin typeface="Arial" panose="020B0604020202020204" pitchFamily="34" charset="0"/>
+              <a:cs typeface="Arial" panose="020B0604020202020204" pitchFamily="34" charset="0"/>
+            </a:endParaRPr>
+          </a:p>
+        </p:txBody>
+      </p:sp>
+      <p:sp>
+        <p:nvSpPr>
+          <p:cNvPr id="33" name="TextBox 32">
+            <a:extLst>
+              <a:ext uri="{FF2B5EF4-FFF2-40B4-BE49-F238E27FC236}">
+                <a16:creationId xmlns:a16="http://schemas.microsoft.com/office/drawing/2014/main" id="{2FCF3B0C-E6D0-4063-BE16-0ECD4B9CA357}"/>
+              </a:ext>
+            </a:extLst>
+          </p:cNvPr>
+          <p:cNvSpPr txBox="1"/>
+          <p:nvPr/>
+        </p:nvSpPr>
+        <p:spPr>
+          <a:xfrm>
+            <a:off x="3206865" y="5661545"/>
+            <a:ext cx="515567" cy="396469"/>
+          </a:xfrm>
+          <a:prstGeom prst="rect">
+            <a:avLst/>
+          </a:prstGeom>
+          <a:solidFill>
+            <a:srgbClr val="00B0F0"/>
+          </a:solidFill>
+          <a:ln w="38100">
+            <a:solidFill>
+              <a:schemeClr val="tx1"/>
+            </a:solidFill>
+          </a:ln>
+        </p:spPr>
+        <p:txBody>
+          <a:bodyPr wrap="square" rtlCol="0">
+            <a:spAutoFit/>
+          </a:bodyPr>
+          <a:lstStyle/>
+          <a:p>
+            <a:r>
+              <a:rPr lang="hu-HU" sz="2000" dirty="0" err="1"/>
+              <a:t>e</a:t>
+            </a:r>
+            <a:r>
+              <a:rPr lang="hu-HU" sz="2000" dirty="0" err="1">
+                <a:solidFill>
+                  <a:schemeClr val="bg1"/>
+                </a:solidFill>
+                <a:latin typeface="Arial" panose="020B0604020202020204" pitchFamily="34" charset="0"/>
+                <a:cs typeface="Arial" panose="020B0604020202020204" pitchFamily="34" charset="0"/>
+              </a:rPr>
+              <a:t>P</a:t>
+            </a:r>
+            <a:endParaRPr lang="en-US" sz="2000" dirty="0">
+              <a:solidFill>
+                <a:schemeClr val="bg1"/>
+              </a:solidFill>
+              <a:latin typeface="Arial" panose="020B0604020202020204" pitchFamily="34" charset="0"/>
+              <a:cs typeface="Arial" panose="020B0604020202020204" pitchFamily="34" charset="0"/>
+            </a:endParaRPr>
+          </a:p>
+        </p:txBody>
+      </p:sp>
+      <p:pic>
+        <p:nvPicPr>
+          <p:cNvPr id="34" name="Graphic 33" descr="Upward trend">
+            <a:extLst>
+              <a:ext uri="{FF2B5EF4-FFF2-40B4-BE49-F238E27FC236}">
+                <a16:creationId xmlns:a16="http://schemas.microsoft.com/office/drawing/2014/main" id="{C38ACD99-7B08-4ADF-9F7D-B8D167AA10EF}"/>
+              </a:ext>
+            </a:extLst>
+          </p:cNvPr>
+          <p:cNvPicPr>
+            <a:picLocks noChangeAspect="1"/>
+          </p:cNvPicPr>
+          <p:nvPr/>
+        </p:nvPicPr>
+        <p:blipFill>
+          <a:blip r:embed="rId6">
+            <a:extLst>
+              <a:ext uri="{28A0092B-C50C-407E-A947-70E740481C1C}">
+                <a14:useLocalDpi xmlns:a14="http://schemas.microsoft.com/office/drawing/2010/main" val="0"/>
+              </a:ext>
+              <a:ext uri="{96DAC541-7B7A-43D3-8B79-37D633B846F1}">
+                <asvg:svgBlip xmlns:asvg="http://schemas.microsoft.com/office/drawing/2016/SVG/main" r:embed="rId7"/>
+              </a:ext>
+            </a:extLst>
+          </a:blip>
+          <a:stretch>
+            <a:fillRect/>
+          </a:stretch>
+        </p:blipFill>
+        <p:spPr>
+          <a:xfrm>
+            <a:off x="3545796" y="6193186"/>
+            <a:ext cx="559067" cy="559067"/>
+          </a:xfrm>
+          <a:prstGeom prst="rect">
+            <a:avLst/>
+          </a:prstGeom>
+        </p:spPr>
+      </p:pic>
+      <p:pic>
+        <p:nvPicPr>
+          <p:cNvPr id="35" name="Graphic 34" descr="High Voltage">
+            <a:extLst>
+              <a:ext uri="{FF2B5EF4-FFF2-40B4-BE49-F238E27FC236}">
+                <a16:creationId xmlns:a16="http://schemas.microsoft.com/office/drawing/2014/main" id="{981A437D-38F6-4CBD-8449-12B49E9828C7}"/>
+              </a:ext>
+            </a:extLst>
+          </p:cNvPr>
+          <p:cNvPicPr>
+            <a:picLocks noChangeAspect="1"/>
+          </p:cNvPicPr>
+          <p:nvPr/>
+        </p:nvPicPr>
+        <p:blipFill>
+          <a:blip r:embed="rId8">
+            <a:extLst>
+              <a:ext uri="{28A0092B-C50C-407E-A947-70E740481C1C}">
+                <a14:useLocalDpi xmlns:a14="http://schemas.microsoft.com/office/drawing/2010/main" val="0"/>
+              </a:ext>
+              <a:ext uri="{96DAC541-7B7A-43D3-8B79-37D633B846F1}">
+                <asvg:svgBlip xmlns:asvg="http://schemas.microsoft.com/office/drawing/2016/SVG/main" r:embed="rId9"/>
+              </a:ext>
+            </a:extLst>
+          </a:blip>
+          <a:stretch>
+            <a:fillRect/>
+          </a:stretch>
+        </p:blipFill>
+        <p:spPr>
+          <a:xfrm>
+            <a:off x="9191446" y="3933113"/>
+            <a:ext cx="436741" cy="436741"/>
+          </a:xfrm>
+          <a:prstGeom prst="rect">
+            <a:avLst/>
+          </a:prstGeom>
+        </p:spPr>
+      </p:pic>
+      <p:pic>
+        <p:nvPicPr>
+          <p:cNvPr id="36" name="Graphic 35" descr="Coins">
+            <a:extLst>
+              <a:ext uri="{FF2B5EF4-FFF2-40B4-BE49-F238E27FC236}">
+                <a16:creationId xmlns:a16="http://schemas.microsoft.com/office/drawing/2014/main" id="{16F8CAFC-F95C-4C1D-801A-D9796DF63597}"/>
+              </a:ext>
+            </a:extLst>
+          </p:cNvPr>
+          <p:cNvPicPr>
+            <a:picLocks noChangeAspect="1"/>
+          </p:cNvPicPr>
+          <p:nvPr/>
+        </p:nvPicPr>
+        <p:blipFill>
+          <a:blip r:embed="rId4">
+            <a:extLst>
+              <a:ext uri="{28A0092B-C50C-407E-A947-70E740481C1C}">
+                <a14:useLocalDpi xmlns:a14="http://schemas.microsoft.com/office/drawing/2010/main" val="0"/>
+              </a:ext>
+              <a:ext uri="{96DAC541-7B7A-43D3-8B79-37D633B846F1}">
+                <asvg:svgBlip xmlns:asvg="http://schemas.microsoft.com/office/drawing/2016/SVG/main" r:embed="rId5"/>
+              </a:ext>
+            </a:extLst>
+          </a:blip>
+          <a:stretch>
+            <a:fillRect/>
+          </a:stretch>
+        </p:blipFill>
+        <p:spPr>
+          <a:xfrm>
+            <a:off x="2540171" y="3635290"/>
+            <a:ext cx="559067" cy="559067"/>
+          </a:xfrm>
+          <a:prstGeom prst="rect">
+            <a:avLst/>
+          </a:prstGeom>
+        </p:spPr>
+      </p:pic>
+      <p:pic>
+        <p:nvPicPr>
+          <p:cNvPr id="37" name="Graphic 36" descr="Upward trend">
+            <a:extLst>
+              <a:ext uri="{FF2B5EF4-FFF2-40B4-BE49-F238E27FC236}">
+                <a16:creationId xmlns:a16="http://schemas.microsoft.com/office/drawing/2014/main" id="{D2DE35C8-6F75-4CAF-89FA-A9917A126058}"/>
+              </a:ext>
+            </a:extLst>
+          </p:cNvPr>
+          <p:cNvPicPr>
+            <a:picLocks noChangeAspect="1"/>
+          </p:cNvPicPr>
+          <p:nvPr/>
+        </p:nvPicPr>
+        <p:blipFill>
+          <a:blip r:embed="rId6">
+            <a:extLst>
+              <a:ext uri="{28A0092B-C50C-407E-A947-70E740481C1C}">
+                <a14:useLocalDpi xmlns:a14="http://schemas.microsoft.com/office/drawing/2010/main" val="0"/>
+              </a:ext>
+              <a:ext uri="{96DAC541-7B7A-43D3-8B79-37D633B846F1}">
+                <asvg:svgBlip xmlns:asvg="http://schemas.microsoft.com/office/drawing/2016/SVG/main" r:embed="rId7"/>
+              </a:ext>
+            </a:extLst>
+          </a:blip>
+          <a:stretch>
+            <a:fillRect/>
+          </a:stretch>
+        </p:blipFill>
+        <p:spPr>
+          <a:xfrm>
+            <a:off x="2849785" y="4290126"/>
+            <a:ext cx="559067" cy="559067"/>
           </a:xfrm>
           <a:prstGeom prst="rect">
             <a:avLst/>

</xml_diff>